<commit_message>
Added points for UI
I have added the points for UI
Now add points for evaluation matric
</commit_message>
<xml_diff>
--- a/GameDesign/Game Design – Design Practices.pptx
+++ b/GameDesign/Game Design – Design Practices.pptx
@@ -10,7 +10,9 @@
     <p:sldId id="258" r:id="rId4"/>
     <p:sldId id="259" r:id="rId5"/>
     <p:sldId id="260" r:id="rId6"/>
-    <p:sldId id="261" r:id="rId7"/>
+    <p:sldId id="262" r:id="rId7"/>
+    <p:sldId id="263" r:id="rId8"/>
+    <p:sldId id="261" r:id="rId9"/>
   </p:sldIdLst>
   <p:sldSz cx="12192000" cy="6858000"/>
   <p:notesSz cx="6858000" cy="9144000"/>
@@ -109,6 +111,11 @@
       </a:defRPr>
     </a:lvl9pPr>
   </p:defaultTextStyle>
+  <p:extLst>
+    <p:ext uri="{EFAFB233-063F-42B5-8137-9DF3F51BA10A}">
+      <p15:sldGuideLst xmlns:p15="http://schemas.microsoft.com/office/powerpoint/2012/main"/>
+    </p:ext>
+  </p:extLst>
 </p:presentation>
 </file>
 
@@ -13670,7 +13677,7 @@
           <a:p>
             <a:fld id="{6AD6EE87-EBD5-4F12-A48A-63ACA297AC8F}" type="datetimeFigureOut">
               <a:rPr lang="en-US" dirty="0"/>
-              <a:t>4/15/2019</a:t>
+              <a:t>5/4/2019</a:t>
             </a:fld>
             <a:endParaRPr lang="en-US" dirty="0"/>
           </a:p>
@@ -13875,7 +13882,7 @@
           <a:p>
             <a:fld id="{4CD73815-2707-4475-8F1A-B873CB631BB4}" type="datetimeFigureOut">
               <a:rPr lang="en-US" dirty="0"/>
-              <a:t>4/15/2019</a:t>
+              <a:t>5/4/2019</a:t>
             </a:fld>
             <a:endParaRPr lang="en-US" dirty="0"/>
           </a:p>
@@ -14053,7 +14060,7 @@
           <a:p>
             <a:fld id="{2A4AFB99-0EAB-4182-AFF8-E214C82A68F6}" type="datetimeFigureOut">
               <a:rPr lang="en-US" dirty="0"/>
-              <a:t>4/15/2019</a:t>
+              <a:t>5/4/2019</a:t>
             </a:fld>
             <a:endParaRPr lang="en-US" dirty="0"/>
           </a:p>
@@ -14256,7 +14263,7 @@
           <a:p>
             <a:fld id="{A5D3794B-289A-4A80-97D7-111025398D45}" type="datetimeFigureOut">
               <a:rPr lang="en-US" dirty="0"/>
-              <a:t>4/15/2019</a:t>
+              <a:t>5/4/2019</a:t>
             </a:fld>
             <a:endParaRPr lang="en-US" dirty="0"/>
           </a:p>
@@ -23152,7 +23159,7 @@
           <a:p>
             <a:fld id="{5A61015F-7CC6-4D0A-9D87-873EA4C304CC}" type="datetimeFigureOut">
               <a:rPr lang="en-US" dirty="0"/>
-              <a:t>4/15/2019</a:t>
+              <a:t>5/4/2019</a:t>
             </a:fld>
             <a:endParaRPr lang="en-US" dirty="0"/>
           </a:p>
@@ -23424,7 +23431,7 @@
           <a:p>
             <a:fld id="{93C6A301-0538-44EC-B09D-202E1042A48B}" type="datetimeFigureOut">
               <a:rPr lang="en-US" dirty="0"/>
-              <a:t>4/15/2019</a:t>
+              <a:t>5/4/2019</a:t>
             </a:fld>
             <a:endParaRPr lang="en-US" dirty="0"/>
           </a:p>
@@ -23820,7 +23827,7 @@
           <a:p>
             <a:fld id="{D789574A-8875-45EF-8EA2-3CAA0F7ABC4C}" type="datetimeFigureOut">
               <a:rPr lang="en-US" dirty="0"/>
-              <a:t>4/15/2019</a:t>
+              <a:t>5/4/2019</a:t>
             </a:fld>
             <a:endParaRPr lang="en-US" dirty="0"/>
           </a:p>
@@ -23936,7 +23943,7 @@
           <a:p>
             <a:fld id="{67EF4D4C-5367-4C26-9E2B-D8088D7FCA81}" type="datetimeFigureOut">
               <a:rPr lang="en-US" dirty="0"/>
-              <a:t>4/15/2019</a:t>
+              <a:t>5/4/2019</a:t>
             </a:fld>
             <a:endParaRPr lang="en-US" dirty="0"/>
           </a:p>
@@ -24029,7 +24036,7 @@
           <a:p>
             <a:fld id="{56E91E96-98B0-4413-9547-46F3504108EF}" type="datetimeFigureOut">
               <a:rPr lang="en-US" dirty="0"/>
-              <a:t>4/15/2019</a:t>
+              <a:t>5/4/2019</a:t>
             </a:fld>
             <a:endParaRPr lang="en-US" dirty="0"/>
           </a:p>
@@ -24317,7 +24324,7 @@
           <a:p>
             <a:fld id="{05C68B11-C5A8-448C-8CE9-B1A273C79CFC}" type="datetimeFigureOut">
               <a:rPr lang="en-US" dirty="0"/>
-              <a:t>4/15/2019</a:t>
+              <a:t>5/4/2019</a:t>
             </a:fld>
             <a:endParaRPr lang="en-US" dirty="0"/>
           </a:p>
@@ -24594,7 +24601,7 @@
           <a:p>
             <a:fld id="{C7616CA0-919D-4A49-9C8A-62FDFB3A5183}" type="datetimeFigureOut">
               <a:rPr lang="en-US" dirty="0"/>
-              <a:t>4/15/2019</a:t>
+              <a:t>5/4/2019</a:t>
             </a:fld>
             <a:endParaRPr lang="en-US" dirty="0"/>
           </a:p>
@@ -24843,7 +24850,7 @@
             <a:fld id="{90298CD5-6C1E-4009-B41F-6DF62E31D3BE}" type="datetimeFigureOut">
               <a:rPr lang="en-US" dirty="0"/>
               <a:pPr/>
-              <a:t>4/15/2019</a:t>
+              <a:t>5/4/2019</a:t>
             </a:fld>
             <a:endParaRPr lang="en-US" dirty="0"/>
           </a:p>
@@ -25756,7 +25763,7 @@
           <a:p>
             <a:r>
               <a:rPr lang="en-IN" dirty="0"/>
-              <a:t>1. Game development in ActionScript 3, used for creating web flash games.</a:t>
+              <a:t>1. Game development in Unity.</a:t>
             </a:r>
           </a:p>
           <a:p>
@@ -25774,7 +25781,7 @@
           <a:p>
             <a:r>
               <a:rPr lang="en-IN" dirty="0"/>
-              <a:t>4. The game will be 2D</a:t>
+              <a:t>4. The game will be 2D.</a:t>
             </a:r>
           </a:p>
         </p:txBody>
@@ -25796,6 +25803,255 @@
 </file>
 
 <file path=ppt/slides/slide6.xml><?xml version="1.0" encoding="utf-8"?>
+<p:sld xmlns:a="http://schemas.openxmlformats.org/drawingml/2006/main" xmlns:r="http://schemas.openxmlformats.org/officeDocument/2006/relationships" xmlns:p="http://schemas.openxmlformats.org/presentationml/2006/main">
+  <p:cSld>
+    <p:spTree>
+      <p:nvGrpSpPr>
+        <p:cNvPr id="1" name=""/>
+        <p:cNvGrpSpPr/>
+        <p:nvPr/>
+      </p:nvGrpSpPr>
+      <p:grpSpPr>
+        <a:xfrm>
+          <a:off x="0" y="0"/>
+          <a:ext cx="0" cy="0"/>
+          <a:chOff x="0" y="0"/>
+          <a:chExt cx="0" cy="0"/>
+        </a:xfrm>
+      </p:grpSpPr>
+      <p:sp>
+        <p:nvSpPr>
+          <p:cNvPr id="2" name="Title 1">
+            <a:extLst>
+              <a:ext uri="{FF2B5EF4-FFF2-40B4-BE49-F238E27FC236}">
+                <a16:creationId xmlns:a16="http://schemas.microsoft.com/office/drawing/2014/main" id="{30302EBB-5647-4443-821C-79BCAEFBC6FA}"/>
+              </a:ext>
+            </a:extLst>
+          </p:cNvPr>
+          <p:cNvSpPr>
+            <a:spLocks noGrp="1"/>
+          </p:cNvSpPr>
+          <p:nvPr>
+            <p:ph type="title"/>
+          </p:nvPr>
+        </p:nvSpPr>
+        <p:spPr/>
+        <p:txBody>
+          <a:bodyPr/>
+          <a:lstStyle/>
+          <a:p>
+            <a:r>
+              <a:rPr lang="en-IN" dirty="0"/>
+              <a:t>Ui/Design</a:t>
+            </a:r>
+          </a:p>
+        </p:txBody>
+      </p:sp>
+      <p:sp>
+        <p:nvSpPr>
+          <p:cNvPr id="3" name="Content Placeholder 2">
+            <a:extLst>
+              <a:ext uri="{FF2B5EF4-FFF2-40B4-BE49-F238E27FC236}">
+                <a16:creationId xmlns:a16="http://schemas.microsoft.com/office/drawing/2014/main" id="{7F95F81D-6DF6-43AB-A1BB-772F7109F8BC}"/>
+              </a:ext>
+            </a:extLst>
+          </p:cNvPr>
+          <p:cNvSpPr>
+            <a:spLocks noGrp="1"/>
+          </p:cNvSpPr>
+          <p:nvPr>
+            <p:ph idx="1"/>
+          </p:nvPr>
+        </p:nvSpPr>
+        <p:spPr/>
+        <p:txBody>
+          <a:bodyPr>
+            <a:normAutofit/>
+          </a:bodyPr>
+          <a:lstStyle/>
+          <a:p>
+            <a:pPr lvl="1"/>
+            <a:r>
+              <a:rPr lang="en-IN" dirty="0"/>
+              <a:t>This is similar as when it came first time in Japan. In this game player controls the laser cannon by moving horizontally across the bottom of the screen and firing at the descending aliens.</a:t>
+            </a:r>
+          </a:p>
+          <a:p>
+            <a:pPr lvl="1"/>
+            <a:r>
+              <a:rPr lang="en-IN" dirty="0"/>
+              <a:t>On screen, we will display</a:t>
+            </a:r>
+          </a:p>
+          <a:p>
+            <a:pPr lvl="2"/>
+            <a:r>
+              <a:rPr lang="en-IN" dirty="0"/>
+              <a:t>Score</a:t>
+            </a:r>
+          </a:p>
+          <a:p>
+            <a:pPr lvl="2"/>
+            <a:r>
+              <a:rPr lang="en-IN" dirty="0"/>
+              <a:t>Percentage of earth resources destroyed</a:t>
+            </a:r>
+          </a:p>
+          <a:p>
+            <a:pPr lvl="2"/>
+            <a:r>
+              <a:rPr lang="en-IN" dirty="0"/>
+              <a:t>Army Health and Player Health. </a:t>
+            </a:r>
+          </a:p>
+          <a:p>
+            <a:pPr lvl="1"/>
+            <a:r>
+              <a:rPr lang="en-IN" dirty="0"/>
+              <a:t>Key Selection: Primary controls: A for left, D for right, Space to shoot; for Second player Arrow Keys, </a:t>
+            </a:r>
+            <a:r>
+              <a:rPr lang="en-IN" dirty="0" err="1"/>
+              <a:t>Num</a:t>
+            </a:r>
+            <a:r>
+              <a:rPr lang="en-IN" dirty="0"/>
+              <a:t> 0 for shooting.</a:t>
+            </a:r>
+          </a:p>
+          <a:p>
+            <a:pPr lvl="1"/>
+            <a:r>
+              <a:rPr lang="en-IN" dirty="0"/>
+              <a:t>Communication Part: After each starting and ending of level their will be small talk(story mode) between players and aliens that will decide the game.</a:t>
+            </a:r>
+          </a:p>
+          <a:p>
+            <a:pPr lvl="1"/>
+            <a:r>
+              <a:rPr lang="en-IN" dirty="0"/>
+              <a:t>Sound on/off feature in game</a:t>
+            </a:r>
+          </a:p>
+          <a:p>
+            <a:pPr lvl="1"/>
+            <a:r>
+              <a:rPr lang="en-IN" dirty="0"/>
+              <a:t>Play/Pause</a:t>
+            </a:r>
+          </a:p>
+        </p:txBody>
+      </p:sp>
+    </p:spTree>
+    <p:extLst>
+      <p:ext uri="{BB962C8B-B14F-4D97-AF65-F5344CB8AC3E}">
+        <p14:creationId xmlns:p14="http://schemas.microsoft.com/office/powerpoint/2010/main" val="3463175463"/>
+      </p:ext>
+    </p:extLst>
+  </p:cSld>
+  <p:clrMapOvr>
+    <a:masterClrMapping/>
+  </p:clrMapOvr>
+  <p:transition spd="med">
+    <p:pull/>
+  </p:transition>
+</p:sld>
+</file>
+
+<file path=ppt/slides/slide7.xml><?xml version="1.0" encoding="utf-8"?>
+<p:sld xmlns:a="http://schemas.openxmlformats.org/drawingml/2006/main" xmlns:r="http://schemas.openxmlformats.org/officeDocument/2006/relationships" xmlns:p="http://schemas.openxmlformats.org/presentationml/2006/main">
+  <p:cSld>
+    <p:spTree>
+      <p:nvGrpSpPr>
+        <p:cNvPr id="1" name=""/>
+        <p:cNvGrpSpPr/>
+        <p:nvPr/>
+      </p:nvGrpSpPr>
+      <p:grpSpPr>
+        <a:xfrm>
+          <a:off x="0" y="0"/>
+          <a:ext cx="0" cy="0"/>
+          <a:chOff x="0" y="0"/>
+          <a:chExt cx="0" cy="0"/>
+        </a:xfrm>
+      </p:grpSpPr>
+      <p:sp>
+        <p:nvSpPr>
+          <p:cNvPr id="2" name="Title 1">
+            <a:extLst>
+              <a:ext uri="{FF2B5EF4-FFF2-40B4-BE49-F238E27FC236}">
+                <a16:creationId xmlns:a16="http://schemas.microsoft.com/office/drawing/2014/main" id="{FDE64926-24D4-4AA7-B872-A5C8F09DCA0B}"/>
+              </a:ext>
+            </a:extLst>
+          </p:cNvPr>
+          <p:cNvSpPr>
+            <a:spLocks noGrp="1"/>
+          </p:cNvSpPr>
+          <p:nvPr>
+            <p:ph type="title"/>
+          </p:nvPr>
+        </p:nvSpPr>
+        <p:spPr/>
+        <p:txBody>
+          <a:bodyPr/>
+          <a:lstStyle/>
+          <a:p>
+            <a:r>
+              <a:rPr lang="en-IN" dirty="0"/>
+              <a:t>Evaluation metrics</a:t>
+            </a:r>
+          </a:p>
+        </p:txBody>
+      </p:sp>
+      <p:sp>
+        <p:nvSpPr>
+          <p:cNvPr id="3" name="Content Placeholder 2">
+            <a:extLst>
+              <a:ext uri="{FF2B5EF4-FFF2-40B4-BE49-F238E27FC236}">
+                <a16:creationId xmlns:a16="http://schemas.microsoft.com/office/drawing/2014/main" id="{118139CD-5095-4E66-B988-E184622BF549}"/>
+              </a:ext>
+            </a:extLst>
+          </p:cNvPr>
+          <p:cNvSpPr>
+            <a:spLocks noGrp="1"/>
+          </p:cNvSpPr>
+          <p:nvPr>
+            <p:ph idx="1"/>
+          </p:nvPr>
+        </p:nvSpPr>
+        <p:spPr/>
+        <p:txBody>
+          <a:bodyPr/>
+          <a:lstStyle/>
+          <a:p>
+            <a:pPr marL="128016" lvl="1" indent="0">
+              <a:buNone/>
+            </a:pPr>
+            <a:endParaRPr lang="en-IN" dirty="0"/>
+          </a:p>
+          <a:p>
+            <a:pPr lvl="1"/>
+            <a:endParaRPr lang="en-IN" dirty="0"/>
+          </a:p>
+        </p:txBody>
+      </p:sp>
+    </p:spTree>
+    <p:extLst>
+      <p:ext uri="{BB962C8B-B14F-4D97-AF65-F5344CB8AC3E}">
+        <p14:creationId xmlns:p14="http://schemas.microsoft.com/office/powerpoint/2010/main" val="1631214369"/>
+      </p:ext>
+    </p:extLst>
+  </p:cSld>
+  <p:clrMapOvr>
+    <a:masterClrMapping/>
+  </p:clrMapOvr>
+  <p:transition spd="med">
+    <p:pull/>
+  </p:transition>
+</p:sld>
+</file>
+
+<file path=ppt/slides/slide8.xml><?xml version="1.0" encoding="utf-8"?>
 <p:sld xmlns:a="http://schemas.openxmlformats.org/drawingml/2006/main" xmlns:r="http://schemas.openxmlformats.org/officeDocument/2006/relationships" xmlns:p="http://schemas.openxmlformats.org/presentationml/2006/main">
   <p:cSld>
     <p:spTree>

</xml_diff>